<commit_message>
minor updates on diagrams
</commit_message>
<xml_diff>
--- a/docs/diagrams/UndoHighLevelSequenceDiagrams.pptx
+++ b/docs/diagrams/UndoHighLevelSequenceDiagrams.pptx
@@ -208,7 +208,7 @@
           <a:p>
             <a:fld id="{F5CC4B3F-88C1-4FFA-B1B6-F41C21DC6924}" type="datetimeFigureOut">
               <a:rPr lang="en-US" smtClean="0"/>
-              <a:t>3/30/17</a:t>
+              <a:t>3/31/17</a:t>
             </a:fld>
             <a:endParaRPr lang="en-US" dirty="0"/>
           </a:p>
@@ -654,7 +654,7 @@
           <a:p>
             <a:fld id="{78C97017-6FC3-485B-9764-EAC9E56C1D49}" type="datetimeFigureOut">
               <a:rPr lang="en-US" smtClean="0"/>
-              <a:t>3/30/17</a:t>
+              <a:t>3/31/17</a:t>
             </a:fld>
             <a:endParaRPr lang="en-US" dirty="0"/>
           </a:p>
@@ -822,7 +822,7 @@
           <a:p>
             <a:fld id="{78C97017-6FC3-485B-9764-EAC9E56C1D49}" type="datetimeFigureOut">
               <a:rPr lang="en-US" smtClean="0"/>
-              <a:t>3/30/17</a:t>
+              <a:t>3/31/17</a:t>
             </a:fld>
             <a:endParaRPr lang="en-US" dirty="0"/>
           </a:p>
@@ -1000,7 +1000,7 @@
           <a:p>
             <a:fld id="{78C97017-6FC3-485B-9764-EAC9E56C1D49}" type="datetimeFigureOut">
               <a:rPr lang="en-US" smtClean="0"/>
-              <a:t>3/30/17</a:t>
+              <a:t>3/31/17</a:t>
             </a:fld>
             <a:endParaRPr lang="en-US" dirty="0"/>
           </a:p>
@@ -1168,7 +1168,7 @@
           <a:p>
             <a:fld id="{78C97017-6FC3-485B-9764-EAC9E56C1D49}" type="datetimeFigureOut">
               <a:rPr lang="en-US" smtClean="0"/>
-              <a:t>3/30/17</a:t>
+              <a:t>3/31/17</a:t>
             </a:fld>
             <a:endParaRPr lang="en-US" dirty="0"/>
           </a:p>
@@ -1413,7 +1413,7 @@
           <a:p>
             <a:fld id="{78C97017-6FC3-485B-9764-EAC9E56C1D49}" type="datetimeFigureOut">
               <a:rPr lang="en-US" smtClean="0"/>
-              <a:t>3/30/17</a:t>
+              <a:t>3/31/17</a:t>
             </a:fld>
             <a:endParaRPr lang="en-US" dirty="0"/>
           </a:p>
@@ -1698,7 +1698,7 @@
           <a:p>
             <a:fld id="{78C97017-6FC3-485B-9764-EAC9E56C1D49}" type="datetimeFigureOut">
               <a:rPr lang="en-US" smtClean="0"/>
-              <a:t>3/30/17</a:t>
+              <a:t>3/31/17</a:t>
             </a:fld>
             <a:endParaRPr lang="en-US" dirty="0"/>
           </a:p>
@@ -2117,7 +2117,7 @@
           <a:p>
             <a:fld id="{78C97017-6FC3-485B-9764-EAC9E56C1D49}" type="datetimeFigureOut">
               <a:rPr lang="en-US" smtClean="0"/>
-              <a:t>3/30/17</a:t>
+              <a:t>3/31/17</a:t>
             </a:fld>
             <a:endParaRPr lang="en-US" dirty="0"/>
           </a:p>
@@ -2234,7 +2234,7 @@
           <a:p>
             <a:fld id="{78C97017-6FC3-485B-9764-EAC9E56C1D49}" type="datetimeFigureOut">
               <a:rPr lang="en-US" smtClean="0"/>
-              <a:t>3/30/17</a:t>
+              <a:t>3/31/17</a:t>
             </a:fld>
             <a:endParaRPr lang="en-US" dirty="0"/>
           </a:p>
@@ -2329,7 +2329,7 @@
           <a:p>
             <a:fld id="{78C97017-6FC3-485B-9764-EAC9E56C1D49}" type="datetimeFigureOut">
               <a:rPr lang="en-US" smtClean="0"/>
-              <a:t>3/30/17</a:t>
+              <a:t>3/31/17</a:t>
             </a:fld>
             <a:endParaRPr lang="en-US" dirty="0"/>
           </a:p>
@@ -2604,7 +2604,7 @@
           <a:p>
             <a:fld id="{78C97017-6FC3-485B-9764-EAC9E56C1D49}" type="datetimeFigureOut">
               <a:rPr lang="en-US" smtClean="0"/>
-              <a:t>3/30/17</a:t>
+              <a:t>3/31/17</a:t>
             </a:fld>
             <a:endParaRPr lang="en-US" dirty="0"/>
           </a:p>
@@ -2856,7 +2856,7 @@
           <a:p>
             <a:fld id="{78C97017-6FC3-485B-9764-EAC9E56C1D49}" type="datetimeFigureOut">
               <a:rPr lang="en-US" smtClean="0"/>
-              <a:t>3/30/17</a:t>
+              <a:t>3/31/17</a:t>
             </a:fld>
             <a:endParaRPr lang="en-US" dirty="0"/>
           </a:p>
@@ -3067,7 +3067,7 @@
           <a:p>
             <a:fld id="{78C97017-6FC3-485B-9764-EAC9E56C1D49}" type="datetimeFigureOut">
               <a:rPr lang="en-US" smtClean="0"/>
-              <a:t>3/30/17</a:t>
+              <a:t>3/31/17</a:t>
             </a:fld>
             <a:endParaRPr lang="en-US" dirty="0"/>
           </a:p>
@@ -4238,23 +4238,7 @@
                   <a:srgbClr val="0070C0"/>
                 </a:solidFill>
               </a:rPr>
-              <a:t>(“</a:t>
-            </a:r>
-            <a:r>
-              <a:rPr lang="en-US" sz="1400" dirty="0" smtClean="0">
-                <a:solidFill>
-                  <a:srgbClr val="0070C0"/>
-                </a:solidFill>
-              </a:rPr>
-              <a:t>undo</a:t>
-            </a:r>
-            <a:r>
-              <a:rPr lang="en-US" sz="1400" dirty="0" smtClean="0">
-                <a:solidFill>
-                  <a:srgbClr val="0070C0"/>
-                </a:solidFill>
-              </a:rPr>
-              <a:t>”)</a:t>
+              <a:t>(“undo”)</a:t>
             </a:r>
             <a:endParaRPr lang="en-US" sz="1400" dirty="0">
               <a:solidFill>
@@ -4813,7 +4797,7 @@
               <a:t>:</a:t>
             </a:r>
             <a:r>
-              <a:rPr lang="en-US" sz="1000" dirty="0" err="1">
+              <a:rPr lang="en-US" sz="1000" dirty="0">
                 <a:solidFill>
                   <a:schemeClr val="bg1"/>
                 </a:solidFill>
@@ -4821,7 +4805,7 @@
               <a:t>U</a:t>
             </a:r>
             <a:r>
-              <a:rPr lang="en-US" sz="1000" dirty="0" err="1" smtClean="0">
+              <a:rPr lang="en-US" sz="1000" dirty="0" smtClean="0">
                 <a:solidFill>
                   <a:schemeClr val="bg1"/>
                 </a:solidFill>
@@ -5025,7 +5009,7 @@
           <a:lstStyle/>
           <a:p>
             <a:r>
-              <a:rPr lang="en-US" sz="1200" dirty="0" err="1" smtClean="0">
+              <a:rPr lang="en-US" sz="1200" dirty="0" smtClean="0">
                 <a:solidFill>
                   <a:schemeClr val="bg2">
                     <a:lumMod val="50000"/>
@@ -5034,13 +5018,6 @@
               </a:rPr>
               <a:t>getUndoOp</a:t>
             </a:r>
-            <a:endParaRPr lang="en-US" sz="1200" dirty="0" smtClean="0">
-              <a:solidFill>
-                <a:schemeClr val="bg2">
-                  <a:lumMod val="50000"/>
-                </a:schemeClr>
-              </a:solidFill>
-            </a:endParaRPr>
           </a:p>
           <a:p>
             <a:r>

</xml_diff>